<commit_message>
maj Streamlit + dummyclassifier
</commit_message>
<xml_diff>
--- a/Résultat.pptx
+++ b/Résultat.pptx
@@ -6,6 +6,8 @@
   </p:sldMasterIdLst>
   <p:sldIdLst>
     <p:sldId id="256" r:id="rId2"/>
+    <p:sldId id="257" r:id="rId3"/>
+    <p:sldId id="258" r:id="rId4"/>
   </p:sldIdLst>
   <p:sldSz cx="12192000" cy="6858000"/>
   <p:notesSz cx="6858000" cy="9144000"/>
@@ -104,6 +106,11 @@
       </a:defRPr>
     </a:lvl9pPr>
   </p:defaultTextStyle>
+  <p:extLst>
+    <p:ext uri="{EFAFB233-063F-42B5-8137-9DF3F51BA10A}">
+      <p15:sldGuideLst xmlns:p15="http://schemas.microsoft.com/office/powerpoint/2012/main"/>
+    </p:ext>
+  </p:extLst>
 </p:presentation>
 </file>
 
@@ -254,7 +261,7 @@
           <a:p>
             <a:fld id="{F73D39CB-7342-AE40-9B7F-CAA9EFCE0D6E}" type="datetimeFigureOut">
               <a:rPr lang="fr-FR" smtClean="0"/>
-              <a:t>03/11/2024</a:t>
+              <a:t>16/11/2024</a:t>
             </a:fld>
             <a:endParaRPr lang="fr-FR"/>
           </a:p>
@@ -452,7 +459,7 @@
           <a:p>
             <a:fld id="{F73D39CB-7342-AE40-9B7F-CAA9EFCE0D6E}" type="datetimeFigureOut">
               <a:rPr lang="fr-FR" smtClean="0"/>
-              <a:t>03/11/2024</a:t>
+              <a:t>16/11/2024</a:t>
             </a:fld>
             <a:endParaRPr lang="fr-FR"/>
           </a:p>
@@ -660,7 +667,7 @@
           <a:p>
             <a:fld id="{F73D39CB-7342-AE40-9B7F-CAA9EFCE0D6E}" type="datetimeFigureOut">
               <a:rPr lang="fr-FR" smtClean="0"/>
-              <a:t>03/11/2024</a:t>
+              <a:t>16/11/2024</a:t>
             </a:fld>
             <a:endParaRPr lang="fr-FR"/>
           </a:p>
@@ -858,7 +865,7 @@
           <a:p>
             <a:fld id="{F73D39CB-7342-AE40-9B7F-CAA9EFCE0D6E}" type="datetimeFigureOut">
               <a:rPr lang="fr-FR" smtClean="0"/>
-              <a:t>03/11/2024</a:t>
+              <a:t>16/11/2024</a:t>
             </a:fld>
             <a:endParaRPr lang="fr-FR"/>
           </a:p>
@@ -1133,7 +1140,7 @@
           <a:p>
             <a:fld id="{F73D39CB-7342-AE40-9B7F-CAA9EFCE0D6E}" type="datetimeFigureOut">
               <a:rPr lang="fr-FR" smtClean="0"/>
-              <a:t>03/11/2024</a:t>
+              <a:t>16/11/2024</a:t>
             </a:fld>
             <a:endParaRPr lang="fr-FR"/>
           </a:p>
@@ -1398,7 +1405,7 @@
           <a:p>
             <a:fld id="{F73D39CB-7342-AE40-9B7F-CAA9EFCE0D6E}" type="datetimeFigureOut">
               <a:rPr lang="fr-FR" smtClean="0"/>
-              <a:t>03/11/2024</a:t>
+              <a:t>16/11/2024</a:t>
             </a:fld>
             <a:endParaRPr lang="fr-FR"/>
           </a:p>
@@ -1810,7 +1817,7 @@
           <a:p>
             <a:fld id="{F73D39CB-7342-AE40-9B7F-CAA9EFCE0D6E}" type="datetimeFigureOut">
               <a:rPr lang="fr-FR" smtClean="0"/>
-              <a:t>03/11/2024</a:t>
+              <a:t>16/11/2024</a:t>
             </a:fld>
             <a:endParaRPr lang="fr-FR"/>
           </a:p>
@@ -1951,7 +1958,7 @@
           <a:p>
             <a:fld id="{F73D39CB-7342-AE40-9B7F-CAA9EFCE0D6E}" type="datetimeFigureOut">
               <a:rPr lang="fr-FR" smtClean="0"/>
-              <a:t>03/11/2024</a:t>
+              <a:t>16/11/2024</a:t>
             </a:fld>
             <a:endParaRPr lang="fr-FR"/>
           </a:p>
@@ -2064,7 +2071,7 @@
           <a:p>
             <a:fld id="{F73D39CB-7342-AE40-9B7F-CAA9EFCE0D6E}" type="datetimeFigureOut">
               <a:rPr lang="fr-FR" smtClean="0"/>
-              <a:t>03/11/2024</a:t>
+              <a:t>16/11/2024</a:t>
             </a:fld>
             <a:endParaRPr lang="fr-FR"/>
           </a:p>
@@ -2375,7 +2382,7 @@
           <a:p>
             <a:fld id="{F73D39CB-7342-AE40-9B7F-CAA9EFCE0D6E}" type="datetimeFigureOut">
               <a:rPr lang="fr-FR" smtClean="0"/>
-              <a:t>03/11/2024</a:t>
+              <a:t>16/11/2024</a:t>
             </a:fld>
             <a:endParaRPr lang="fr-FR"/>
           </a:p>
@@ -2663,7 +2670,7 @@
           <a:p>
             <a:fld id="{F73D39CB-7342-AE40-9B7F-CAA9EFCE0D6E}" type="datetimeFigureOut">
               <a:rPr lang="fr-FR" smtClean="0"/>
-              <a:t>03/11/2024</a:t>
+              <a:t>16/11/2024</a:t>
             </a:fld>
             <a:endParaRPr lang="fr-FR"/>
           </a:p>
@@ -2904,7 +2911,7 @@
           <a:p>
             <a:fld id="{F73D39CB-7342-AE40-9B7F-CAA9EFCE0D6E}" type="datetimeFigureOut">
               <a:rPr lang="fr-FR" smtClean="0"/>
-              <a:t>03/11/2024</a:t>
+              <a:t>16/11/2024</a:t>
             </a:fld>
             <a:endParaRPr lang="fr-FR"/>
           </a:p>
@@ -3394,6 +3401,126 @@
 </p:sld>
 </file>
 
+<file path=ppt/slides/slide2.xml><?xml version="1.0" encoding="utf-8"?>
+<p:sld xmlns:a="http://schemas.openxmlformats.org/drawingml/2006/main" xmlns:r="http://schemas.openxmlformats.org/officeDocument/2006/relationships" xmlns:p="http://schemas.openxmlformats.org/presentationml/2006/main">
+  <p:cSld>
+    <p:spTree>
+      <p:nvGrpSpPr>
+        <p:cNvPr id="1" name=""/>
+        <p:cNvGrpSpPr/>
+        <p:nvPr/>
+      </p:nvGrpSpPr>
+      <p:grpSpPr>
+        <a:xfrm>
+          <a:off x="0" y="0"/>
+          <a:ext cx="0" cy="0"/>
+          <a:chOff x="0" y="0"/>
+          <a:chExt cx="0" cy="0"/>
+        </a:xfrm>
+      </p:grpSpPr>
+      <p:pic>
+        <p:nvPicPr>
+          <p:cNvPr id="4" name="Image 3">
+            <a:extLst>
+              <a:ext uri="{FF2B5EF4-FFF2-40B4-BE49-F238E27FC236}">
+                <a16:creationId xmlns:a16="http://schemas.microsoft.com/office/drawing/2014/main" id="{4B416986-0F3F-2232-33E1-6282284B85E9}"/>
+              </a:ext>
+            </a:extLst>
+          </p:cNvPr>
+          <p:cNvPicPr>
+            <a:picLocks noChangeAspect="1"/>
+          </p:cNvPicPr>
+          <p:nvPr/>
+        </p:nvPicPr>
+        <p:blipFill>
+          <a:blip r:embed="rId2"/>
+          <a:stretch>
+            <a:fillRect/>
+          </a:stretch>
+        </p:blipFill>
+        <p:spPr>
+          <a:xfrm>
+            <a:off x="2209800" y="2062484"/>
+            <a:ext cx="7772400" cy="2733032"/>
+          </a:xfrm>
+          <a:prstGeom prst="rect">
+            <a:avLst/>
+          </a:prstGeom>
+        </p:spPr>
+      </p:pic>
+    </p:spTree>
+    <p:extLst>
+      <p:ext uri="{BB962C8B-B14F-4D97-AF65-F5344CB8AC3E}">
+        <p14:creationId xmlns:p14="http://schemas.microsoft.com/office/powerpoint/2010/main" val="410353064"/>
+      </p:ext>
+    </p:extLst>
+  </p:cSld>
+  <p:clrMapOvr>
+    <a:masterClrMapping/>
+  </p:clrMapOvr>
+</p:sld>
+</file>
+
+<file path=ppt/slides/slide3.xml><?xml version="1.0" encoding="utf-8"?>
+<p:sld xmlns:a="http://schemas.openxmlformats.org/drawingml/2006/main" xmlns:r="http://schemas.openxmlformats.org/officeDocument/2006/relationships" xmlns:p="http://schemas.openxmlformats.org/presentationml/2006/main">
+  <p:cSld>
+    <p:spTree>
+      <p:nvGrpSpPr>
+        <p:cNvPr id="1" name=""/>
+        <p:cNvGrpSpPr/>
+        <p:nvPr/>
+      </p:nvGrpSpPr>
+      <p:grpSpPr>
+        <a:xfrm>
+          <a:off x="0" y="0"/>
+          <a:ext cx="0" cy="0"/>
+          <a:chOff x="0" y="0"/>
+          <a:chExt cx="0" cy="0"/>
+        </a:xfrm>
+      </p:grpSpPr>
+      <p:pic>
+        <p:nvPicPr>
+          <p:cNvPr id="4" name="Image 3">
+            <a:extLst>
+              <a:ext uri="{FF2B5EF4-FFF2-40B4-BE49-F238E27FC236}">
+                <a16:creationId xmlns:a16="http://schemas.microsoft.com/office/drawing/2014/main" id="{FC657DF4-58D9-5D10-D6F2-D5B0D28DDDD5}"/>
+              </a:ext>
+            </a:extLst>
+          </p:cNvPr>
+          <p:cNvPicPr>
+            <a:picLocks noChangeAspect="1"/>
+          </p:cNvPicPr>
+          <p:nvPr/>
+        </p:nvPicPr>
+        <p:blipFill>
+          <a:blip r:embed="rId2"/>
+          <a:stretch>
+            <a:fillRect/>
+          </a:stretch>
+        </p:blipFill>
+        <p:spPr>
+          <a:xfrm>
+            <a:off x="2209800" y="2400726"/>
+            <a:ext cx="7772400" cy="2056548"/>
+          </a:xfrm>
+          <a:prstGeom prst="rect">
+            <a:avLst/>
+          </a:prstGeom>
+        </p:spPr>
+      </p:pic>
+    </p:spTree>
+    <p:extLst>
+      <p:ext uri="{BB962C8B-B14F-4D97-AF65-F5344CB8AC3E}">
+        <p14:creationId xmlns:p14="http://schemas.microsoft.com/office/powerpoint/2010/main" val="2204012159"/>
+      </p:ext>
+    </p:extLst>
+  </p:cSld>
+  <p:clrMapOvr>
+    <a:masterClrMapping/>
+  </p:clrMapOvr>
+</p:sld>
+</file>
+
 <file path=ppt/theme/theme1.xml><?xml version="1.0" encoding="utf-8"?>
 <a:theme xmlns:a="http://schemas.openxmlformats.org/drawingml/2006/main" name="Thème Office">
   <a:themeElements>

</xml_diff>